<commit_message>
Up To UI Controller Life Cycle
</commit_message>
<xml_diff>
--- a/02-Development/01-Developer-Guide/02_UI-Controller/70_UI-Controller-Life-Cycle/UILifeCycle.pptx
+++ b/02-Development/01-Developer-Guide/02_UI-Controller/70_UI-Controller-Life-Cycle/UILifeCycle.pptx
@@ -5,13 +5,14 @@
     <p:sldMasterId id="2147483660" r:id="rId3"/>
   </p:sldMasterIdLst>
   <p:notesMasterIdLst>
-    <p:notesMasterId r:id="rId5"/>
+    <p:notesMasterId r:id="rId6"/>
   </p:notesMasterIdLst>
   <p:handoutMasterIdLst>
-    <p:handoutMasterId r:id="rId6"/>
+    <p:handoutMasterId r:id="rId7"/>
   </p:handoutMasterIdLst>
   <p:sldIdLst>
-    <p:sldId id="290" r:id="rId4"/>
+    <p:sldId id="291" r:id="rId4"/>
+    <p:sldId id="290" r:id="rId5"/>
   </p:sldIdLst>
   <p:sldSz cx="12192000" cy="6858000"/>
   <p:notesSz cx="6858000" cy="9144000"/>
@@ -225,7 +226,7 @@
           <a:p>
             <a:fld id="{0C562DBC-A057-4482-B1DA-F1223766652F}" type="datetimeFigureOut">
               <a:rPr lang="he-IL" smtClean="0"/>
-              <a:t>י"א/שבט/תשע"ז</a:t>
+              <a:t>כ"ו/שבט/תשע"ז</a:t>
             </a:fld>
             <a:endParaRPr lang="he-IL"/>
           </a:p>
@@ -390,7 +391,7 @@
           <a:p>
             <a:fld id="{79B72168-67EB-4E58-85AA-EDFD7A3D899E}" type="datetimeFigureOut">
               <a:rPr lang="en-US" smtClean="0"/>
-              <a:t>2/7/2017</a:t>
+              <a:t>2/22/2017</a:t>
             </a:fld>
             <a:endParaRPr lang="en-US"/>
           </a:p>
@@ -727,7 +728,7 @@
           <a:p>
             <a:fld id="{B9481C2B-38DC-427F-9F6F-35E2AA129D6D}" type="slidenum">
               <a:rPr lang="en-US" smtClean="0"/>
-              <a:t>1</a:t>
+              <a:t>2</a:t>
             </a:fld>
             <a:endParaRPr lang="en-US"/>
           </a:p>
@@ -2488,6 +2489,474 @@
       </p:grpSpPr>
       <p:sp>
         <p:nvSpPr>
+          <p:cNvPr id="22530" name="Rectangle 2"/>
+          <p:cNvSpPr>
+            <a:spLocks noGrp="1" noChangeArrowheads="1"/>
+          </p:cNvSpPr>
+          <p:nvPr>
+            <p:ph type="title"/>
+          </p:nvPr>
+        </p:nvSpPr>
+        <p:spPr/>
+        <p:txBody>
+          <a:bodyPr/>
+          <a:lstStyle/>
+          <a:p>
+            <a:r>
+              <a:rPr lang="en-US" altLang="en-US" dirty="0"/>
+              <a:t>Calling a controller</a:t>
+            </a:r>
+          </a:p>
+        </p:txBody>
+      </p:sp>
+      <p:sp>
+        <p:nvSpPr>
+          <p:cNvPr id="3" name="Slide Number Placeholder 2"/>
+          <p:cNvSpPr>
+            <a:spLocks noGrp="1"/>
+          </p:cNvSpPr>
+          <p:nvPr>
+            <p:ph type="sldNum" sz="quarter" idx="12"/>
+          </p:nvPr>
+        </p:nvSpPr>
+        <p:spPr/>
+        <p:txBody>
+          <a:bodyPr/>
+          <a:lstStyle/>
+          <a:p>
+            <a:pPr>
+              <a:defRPr/>
+            </a:pPr>
+            <a:fld id="{C5A4A91C-EC18-4A23-96E0-5487FD4C836A}" type="slidenum">
+              <a:rPr lang="he-IL" smtClean="0"/>
+              <a:pPr>
+                <a:defRPr/>
+              </a:pPr>
+              <a:t>1</a:t>
+            </a:fld>
+            <a:endParaRPr lang="en-US" dirty="0"/>
+          </a:p>
+        </p:txBody>
+      </p:sp>
+      <p:sp>
+        <p:nvSpPr>
+          <p:cNvPr id="4" name="Right Brace 3"/>
+          <p:cNvSpPr/>
+          <p:nvPr/>
+        </p:nvSpPr>
+        <p:spPr>
+          <a:xfrm rot="5400000">
+            <a:off x="4799956" y="-1049709"/>
+            <a:ext cx="648072" cy="6285584"/>
+          </a:xfrm>
+          <a:prstGeom prst="rightBrace">
+            <a:avLst>
+              <a:gd name="adj1" fmla="val 8333"/>
+              <a:gd name="adj2" fmla="val 54016"/>
+            </a:avLst>
+          </a:prstGeom>
+        </p:spPr>
+        <p:style>
+          <a:lnRef idx="1">
+            <a:schemeClr val="accent1"/>
+          </a:lnRef>
+          <a:fillRef idx="0">
+            <a:schemeClr val="accent1"/>
+          </a:fillRef>
+          <a:effectRef idx="0">
+            <a:schemeClr val="accent1"/>
+          </a:effectRef>
+          <a:fontRef idx="minor">
+            <a:schemeClr val="tx1"/>
+          </a:fontRef>
+        </p:style>
+        <p:txBody>
+          <a:bodyPr rtlCol="0" anchor="ctr"/>
+          <a:lstStyle/>
+          <a:p>
+            <a:pPr algn="ctr"/>
+            <a:endParaRPr lang="en-US"/>
+          </a:p>
+        </p:txBody>
+      </p:sp>
+      <p:pic>
+        <p:nvPicPr>
+          <p:cNvPr id="10" name="Picture 9"/>
+          <p:cNvPicPr>
+            <a:picLocks noChangeAspect="1"/>
+          </p:cNvPicPr>
+          <p:nvPr/>
+        </p:nvPicPr>
+        <p:blipFill>
+          <a:blip r:embed="rId2"/>
+          <a:stretch>
+            <a:fillRect/>
+          </a:stretch>
+        </p:blipFill>
+        <p:spPr>
+          <a:xfrm>
+            <a:off x="1559496" y="3789040"/>
+            <a:ext cx="8912368" cy="2259124"/>
+          </a:xfrm>
+          <a:prstGeom prst="rect">
+            <a:avLst/>
+          </a:prstGeom>
+          <a:ln>
+            <a:noFill/>
+          </a:ln>
+          <a:effectLst>
+            <a:outerShdw blurRad="292100" dist="139700" dir="2700000" algn="tl" rotWithShape="0">
+              <a:srgbClr val="333333">
+                <a:alpha val="65000"/>
+              </a:srgbClr>
+            </a:outerShdw>
+          </a:effectLst>
+        </p:spPr>
+      </p:pic>
+      <p:sp>
+        <p:nvSpPr>
+          <p:cNvPr id="6" name="TextBox 5"/>
+          <p:cNvSpPr txBox="1"/>
+          <p:nvPr/>
+        </p:nvSpPr>
+        <p:spPr>
+          <a:xfrm>
+            <a:off x="3143672" y="2492896"/>
+            <a:ext cx="3384376" cy="707886"/>
+          </a:xfrm>
+          <a:prstGeom prst="rect">
+            <a:avLst/>
+          </a:prstGeom>
+          <a:noFill/>
+        </p:spPr>
+        <p:txBody>
+          <a:bodyPr wrap="square" rtlCol="0">
+            <a:spAutoFit/>
+          </a:bodyPr>
+          <a:lstStyle/>
+          <a:p>
+            <a:pPr algn="ctr"/>
+            <a:r>
+              <a:rPr lang="en-US" sz="2000" dirty="0"/>
+              <a:t>Calls the constructor and creates an instance</a:t>
+            </a:r>
+          </a:p>
+        </p:txBody>
+      </p:sp>
+      <p:cxnSp>
+        <p:nvCxnSpPr>
+          <p:cNvPr id="8" name="Straight Arrow Connector 7"/>
+          <p:cNvCxnSpPr>
+            <a:stCxn id="6" idx="2"/>
+          </p:cNvCxnSpPr>
+          <p:nvPr/>
+        </p:nvCxnSpPr>
+        <p:spPr>
+          <a:xfrm flipH="1">
+            <a:off x="3071664" y="3200782"/>
+            <a:ext cx="1764196" cy="588258"/>
+          </a:xfrm>
+          <a:prstGeom prst="straightConnector1">
+            <a:avLst/>
+          </a:prstGeom>
+          <a:ln>
+            <a:tailEnd type="triangle"/>
+          </a:ln>
+        </p:spPr>
+        <p:style>
+          <a:lnRef idx="3">
+            <a:schemeClr val="accent2"/>
+          </a:lnRef>
+          <a:fillRef idx="0">
+            <a:schemeClr val="accent2"/>
+          </a:fillRef>
+          <a:effectRef idx="2">
+            <a:schemeClr val="accent2"/>
+          </a:effectRef>
+          <a:fontRef idx="minor">
+            <a:schemeClr val="tx1"/>
+          </a:fontRef>
+        </p:style>
+      </p:cxnSp>
+      <p:pic>
+        <p:nvPicPr>
+          <p:cNvPr id="13" name="Picture 12"/>
+          <p:cNvPicPr>
+            <a:picLocks noChangeAspect="1"/>
+          </p:cNvPicPr>
+          <p:nvPr/>
+        </p:nvPicPr>
+        <p:blipFill>
+          <a:blip r:embed="rId3"/>
+          <a:stretch>
+            <a:fillRect/>
+          </a:stretch>
+        </p:blipFill>
+        <p:spPr>
+          <a:xfrm>
+            <a:off x="1981200" y="1402482"/>
+            <a:ext cx="7497044" cy="514350"/>
+          </a:xfrm>
+          <a:prstGeom prst="rect">
+            <a:avLst/>
+          </a:prstGeom>
+        </p:spPr>
+      </p:pic>
+    </p:spTree>
+    <p:extLst>
+      <p:ext uri="{BB962C8B-B14F-4D97-AF65-F5344CB8AC3E}">
+        <p14:creationId xmlns:p14="http://schemas.microsoft.com/office/powerpoint/2010/main" val="878881772"/>
+      </p:ext>
+    </p:extLst>
+  </p:cSld>
+  <p:clrMapOvr>
+    <a:masterClrMapping/>
+  </p:clrMapOvr>
+  <p:timing>
+    <p:tnLst>
+      <p:par>
+        <p:cTn id="1" dur="indefinite" restart="never" nodeType="tmRoot">
+          <p:childTnLst>
+            <p:seq concurrent="1" nextAc="seek">
+              <p:cTn id="2" dur="indefinite" nodeType="mainSeq">
+                <p:childTnLst>
+                  <p:par>
+                    <p:cTn id="3" fill="hold">
+                      <p:stCondLst>
+                        <p:cond delay="indefinite"/>
+                      </p:stCondLst>
+                      <p:childTnLst>
+                        <p:par>
+                          <p:cTn id="4" fill="hold">
+                            <p:stCondLst>
+                              <p:cond delay="0"/>
+                            </p:stCondLst>
+                            <p:childTnLst>
+                              <p:par>
+                                <p:cTn id="5" presetID="1" presetClass="entr" presetSubtype="0" fill="hold" nodeType="clickEffect">
+                                  <p:stCondLst>
+                                    <p:cond delay="0"/>
+                                  </p:stCondLst>
+                                  <p:childTnLst>
+                                    <p:set>
+                                      <p:cBhvr>
+                                        <p:cTn id="6" dur="1" fill="hold">
+                                          <p:stCondLst>
+                                            <p:cond delay="0"/>
+                                          </p:stCondLst>
+                                        </p:cTn>
+                                        <p:tgtEl>
+                                          <p:spTgt spid="13"/>
+                                        </p:tgtEl>
+                                        <p:attrNameLst>
+                                          <p:attrName>style.visibility</p:attrName>
+                                        </p:attrNameLst>
+                                      </p:cBhvr>
+                                      <p:to>
+                                        <p:strVal val="visible"/>
+                                      </p:to>
+                                    </p:set>
+                                  </p:childTnLst>
+                                </p:cTn>
+                              </p:par>
+                            </p:childTnLst>
+                          </p:cTn>
+                        </p:par>
+                      </p:childTnLst>
+                    </p:cTn>
+                  </p:par>
+                  <p:par>
+                    <p:cTn id="7" fill="hold">
+                      <p:stCondLst>
+                        <p:cond delay="indefinite"/>
+                      </p:stCondLst>
+                      <p:childTnLst>
+                        <p:par>
+                          <p:cTn id="8" fill="hold">
+                            <p:stCondLst>
+                              <p:cond delay="0"/>
+                            </p:stCondLst>
+                            <p:childTnLst>
+                              <p:par>
+                                <p:cTn id="9" presetID="1" presetClass="entr" presetSubtype="0" fill="hold" grpId="0" nodeType="clickEffect">
+                                  <p:stCondLst>
+                                    <p:cond delay="0"/>
+                                  </p:stCondLst>
+                                  <p:childTnLst>
+                                    <p:set>
+                                      <p:cBhvr>
+                                        <p:cTn id="10" dur="1" fill="hold">
+                                          <p:stCondLst>
+                                            <p:cond delay="0"/>
+                                          </p:stCondLst>
+                                        </p:cTn>
+                                        <p:tgtEl>
+                                          <p:spTgt spid="4"/>
+                                        </p:tgtEl>
+                                        <p:attrNameLst>
+                                          <p:attrName>style.visibility</p:attrName>
+                                        </p:attrNameLst>
+                                      </p:cBhvr>
+                                      <p:to>
+                                        <p:strVal val="visible"/>
+                                      </p:to>
+                                    </p:set>
+                                  </p:childTnLst>
+                                </p:cTn>
+                              </p:par>
+                              <p:par>
+                                <p:cTn id="11" presetID="1" presetClass="entr" presetSubtype="0" fill="hold" grpId="0" nodeType="withEffect">
+                                  <p:stCondLst>
+                                    <p:cond delay="0"/>
+                                  </p:stCondLst>
+                                  <p:childTnLst>
+                                    <p:set>
+                                      <p:cBhvr>
+                                        <p:cTn id="12" dur="1" fill="hold">
+                                          <p:stCondLst>
+                                            <p:cond delay="0"/>
+                                          </p:stCondLst>
+                                        </p:cTn>
+                                        <p:tgtEl>
+                                          <p:spTgt spid="6"/>
+                                        </p:tgtEl>
+                                        <p:attrNameLst>
+                                          <p:attrName>style.visibility</p:attrName>
+                                        </p:attrNameLst>
+                                      </p:cBhvr>
+                                      <p:to>
+                                        <p:strVal val="visible"/>
+                                      </p:to>
+                                    </p:set>
+                                  </p:childTnLst>
+                                </p:cTn>
+                              </p:par>
+                            </p:childTnLst>
+                          </p:cTn>
+                        </p:par>
+                      </p:childTnLst>
+                    </p:cTn>
+                  </p:par>
+                  <p:par>
+                    <p:cTn id="13" fill="hold">
+                      <p:stCondLst>
+                        <p:cond delay="indefinite"/>
+                      </p:stCondLst>
+                      <p:childTnLst>
+                        <p:par>
+                          <p:cTn id="14" fill="hold">
+                            <p:stCondLst>
+                              <p:cond delay="0"/>
+                            </p:stCondLst>
+                            <p:childTnLst>
+                              <p:par>
+                                <p:cTn id="15" presetID="1" presetClass="entr" presetSubtype="0" fill="hold" nodeType="clickEffect">
+                                  <p:stCondLst>
+                                    <p:cond delay="0"/>
+                                  </p:stCondLst>
+                                  <p:childTnLst>
+                                    <p:set>
+                                      <p:cBhvr>
+                                        <p:cTn id="16" dur="1" fill="hold">
+                                          <p:stCondLst>
+                                            <p:cond delay="0"/>
+                                          </p:stCondLst>
+                                        </p:cTn>
+                                        <p:tgtEl>
+                                          <p:spTgt spid="8"/>
+                                        </p:tgtEl>
+                                        <p:attrNameLst>
+                                          <p:attrName>style.visibility</p:attrName>
+                                        </p:attrNameLst>
+                                      </p:cBhvr>
+                                      <p:to>
+                                        <p:strVal val="visible"/>
+                                      </p:to>
+                                    </p:set>
+                                  </p:childTnLst>
+                                </p:cTn>
+                              </p:par>
+                              <p:par>
+                                <p:cTn id="17" presetID="1" presetClass="entr" presetSubtype="0" fill="hold" nodeType="withEffect">
+                                  <p:stCondLst>
+                                    <p:cond delay="0"/>
+                                  </p:stCondLst>
+                                  <p:childTnLst>
+                                    <p:set>
+                                      <p:cBhvr>
+                                        <p:cTn id="18" dur="1" fill="hold">
+                                          <p:stCondLst>
+                                            <p:cond delay="0"/>
+                                          </p:stCondLst>
+                                        </p:cTn>
+                                        <p:tgtEl>
+                                          <p:spTgt spid="10"/>
+                                        </p:tgtEl>
+                                        <p:attrNameLst>
+                                          <p:attrName>style.visibility</p:attrName>
+                                        </p:attrNameLst>
+                                      </p:cBhvr>
+                                      <p:to>
+                                        <p:strVal val="visible"/>
+                                      </p:to>
+                                    </p:set>
+                                  </p:childTnLst>
+                                </p:cTn>
+                              </p:par>
+                            </p:childTnLst>
+                          </p:cTn>
+                        </p:par>
+                      </p:childTnLst>
+                    </p:cTn>
+                  </p:par>
+                </p:childTnLst>
+              </p:cTn>
+              <p:prevCondLst>
+                <p:cond evt="onPrev" delay="0">
+                  <p:tgtEl>
+                    <p:sldTgt/>
+                  </p:tgtEl>
+                </p:cond>
+              </p:prevCondLst>
+              <p:nextCondLst>
+                <p:cond evt="onNext" delay="0">
+                  <p:tgtEl>
+                    <p:sldTgt/>
+                  </p:tgtEl>
+                </p:cond>
+              </p:nextCondLst>
+            </p:seq>
+          </p:childTnLst>
+        </p:cTn>
+      </p:par>
+    </p:tnLst>
+    <p:bldLst>
+      <p:bldP spid="4" grpId="0" animBg="1"/>
+      <p:bldP spid="6" grpId="0"/>
+    </p:bldLst>
+  </p:timing>
+</p:sld>
+</file>
+
+<file path=ppt/slides/slide2.xml><?xml version="1.0" encoding="utf-8"?>
+<p:sld xmlns:a="http://schemas.openxmlformats.org/drawingml/2006/main" xmlns:r="http://schemas.openxmlformats.org/officeDocument/2006/relationships" xmlns:p="http://schemas.openxmlformats.org/presentationml/2006/main">
+  <p:cSld>
+    <p:spTree>
+      <p:nvGrpSpPr>
+        <p:cNvPr id="1" name=""/>
+        <p:cNvGrpSpPr/>
+        <p:nvPr/>
+      </p:nvGrpSpPr>
+      <p:grpSpPr>
+        <a:xfrm>
+          <a:off x="0" y="0"/>
+          <a:ext cx="0" cy="0"/>
+          <a:chOff x="0" y="0"/>
+          <a:chExt cx="0" cy="0"/>
+        </a:xfrm>
+      </p:grpSpPr>
+      <p:sp>
+        <p:nvSpPr>
           <p:cNvPr id="2" name="Title 1"/>
           <p:cNvSpPr>
             <a:spLocks noGrp="1"/>
@@ -2531,7 +3000,7 @@
               <a:pPr>
                 <a:defRPr/>
               </a:pPr>
-              <a:t>1</a:t>
+              <a:t>2</a:t>
             </a:fld>
             <a:endParaRPr lang="en-US" dirty="0"/>
           </a:p>
@@ -4265,18 +4734,18 @@
 
 <file path=customXml/item1.xml><?xml version="1.0" encoding="utf-8"?>
 <Control xmlns="http://schemas.microsoft.com/VisualStudio/2011/storyboarding/control">
-  <Id Name="System.Storyboarding.Backgrounds.Window" Revision="1" Stencil="System.Storyboarding.Backgrounds" StencilVersion="0.1"/>
+  <Id Name="System.Storyboarding.Common.Button" Revision="1" Stencil="System.Storyboarding.Common" StencilVersion="0.1"/>
 </Control>
 </file>
 
 <file path=customXml/item2.xml><?xml version="1.0" encoding="utf-8"?>
 <Control xmlns="http://schemas.microsoft.com/VisualStudio/2011/storyboarding/control">
-  <Id Name="System.Storyboarding.Common.Button" Revision="1" Stencil="System.Storyboarding.Common" StencilVersion="0.1"/>
+  <Id Name="System.Storyboarding.Backgrounds.Window" Revision="1" Stencil="System.Storyboarding.Backgrounds" StencilVersion="0.1"/>
 </Control>
 </file>
 
 <file path=customXml/itemProps1.xml><?xml version="1.0" encoding="utf-8"?>
-<ds:datastoreItem xmlns:ds="http://schemas.openxmlformats.org/officeDocument/2006/customXml" ds:itemID="{244FD858-3F76-43FA-A4C6-ED056076F946}">
+<ds:datastoreItem xmlns:ds="http://schemas.openxmlformats.org/officeDocument/2006/customXml" ds:itemID="{921ECF36-2FFA-46BD-A402-8D8EBCA8F3B8}">
   <ds:schemaRefs>
     <ds:schemaRef ds:uri="http://schemas.microsoft.com/VisualStudio/2011/storyboarding/control"/>
   </ds:schemaRefs>
@@ -4284,7 +4753,7 @@
 </file>
 
 <file path=customXml/itemProps2.xml><?xml version="1.0" encoding="utf-8"?>
-<ds:datastoreItem xmlns:ds="http://schemas.openxmlformats.org/officeDocument/2006/customXml" ds:itemID="{921ECF36-2FFA-46BD-A402-8D8EBCA8F3B8}">
+<ds:datastoreItem xmlns:ds="http://schemas.openxmlformats.org/officeDocument/2006/customXml" ds:itemID="{244FD858-3F76-43FA-A4C6-ED056076F946}">
   <ds:schemaRefs>
     <ds:schemaRef ds:uri="http://schemas.microsoft.com/VisualStudio/2011/storyboarding/control"/>
   </ds:schemaRefs>

</xml_diff>